<commit_message>
Removed some debugging code in JS and finished powerpoint
</commit_message>
<xml_diff>
--- a/documentation/Footbal Squad Builder.pptx
+++ b/documentation/Footbal Squad Builder.pptx
@@ -13,14 +13,15 @@
     <p:sldId id="261" r:id="rId7"/>
     <p:sldId id="262" r:id="rId8"/>
     <p:sldId id="263" r:id="rId9"/>
-    <p:sldId id="265" r:id="rId10"/>
-    <p:sldId id="266" r:id="rId11"/>
-    <p:sldId id="267" r:id="rId12"/>
-    <p:sldId id="268" r:id="rId13"/>
-    <p:sldId id="269" r:id="rId14"/>
-    <p:sldId id="270" r:id="rId15"/>
-    <p:sldId id="271" r:id="rId16"/>
-    <p:sldId id="272" r:id="rId17"/>
+    <p:sldId id="273" r:id="rId10"/>
+    <p:sldId id="265" r:id="rId11"/>
+    <p:sldId id="266" r:id="rId12"/>
+    <p:sldId id="267" r:id="rId13"/>
+    <p:sldId id="268" r:id="rId14"/>
+    <p:sldId id="269" r:id="rId15"/>
+    <p:sldId id="270" r:id="rId16"/>
+    <p:sldId id="271" r:id="rId17"/>
+    <p:sldId id="272" r:id="rId18"/>
   </p:sldIdLst>
   <p:sldSz cx="12192000" cy="6858000"/>
   <p:notesSz cx="6858000" cy="9144000"/>
@@ -119,6 +120,11 @@
       </a:defRPr>
     </a:lvl9pPr>
   </p:defaultTextStyle>
+  <p:extLst>
+    <p:ext uri="{EFAFB233-063F-42B5-8137-9DF3F51BA10A}">
+      <p15:sldGuideLst xmlns:p15="http://schemas.microsoft.com/office/powerpoint/2012/main"/>
+    </p:ext>
+  </p:extLst>
 </p:presentation>
 </file>
 
@@ -277,7 +283,7 @@
           <a:p>
             <a:fld id="{D3DA5F4E-FA42-442E-8505-3C5882CD17FC}" type="datetimeFigureOut">
               <a:rPr lang="en-GB" smtClean="0"/>
-              <a:t>28/07/2022</a:t>
+              <a:t>29/07/2022</a:t>
             </a:fld>
             <a:endParaRPr lang="en-GB"/>
           </a:p>
@@ -447,7 +453,7 @@
           <a:p>
             <a:fld id="{D3DA5F4E-FA42-442E-8505-3C5882CD17FC}" type="datetimeFigureOut">
               <a:rPr lang="en-GB" smtClean="0"/>
-              <a:t>28/07/2022</a:t>
+              <a:t>29/07/2022</a:t>
             </a:fld>
             <a:endParaRPr lang="en-GB"/>
           </a:p>
@@ -627,7 +633,7 @@
           <a:p>
             <a:fld id="{D3DA5F4E-FA42-442E-8505-3C5882CD17FC}" type="datetimeFigureOut">
               <a:rPr lang="en-GB" smtClean="0"/>
-              <a:t>28/07/2022</a:t>
+              <a:t>29/07/2022</a:t>
             </a:fld>
             <a:endParaRPr lang="en-GB"/>
           </a:p>
@@ -804,7 +810,7 @@
           <a:p>
             <a:fld id="{D3DA5F4E-FA42-442E-8505-3C5882CD17FC}" type="datetimeFigureOut">
               <a:rPr lang="en-GB" smtClean="0"/>
-              <a:t>28/07/2022</a:t>
+              <a:t>29/07/2022</a:t>
             </a:fld>
             <a:endParaRPr lang="en-GB"/>
           </a:p>
@@ -1068,7 +1074,7 @@
           <a:p>
             <a:fld id="{D3DA5F4E-FA42-442E-8505-3C5882CD17FC}" type="datetimeFigureOut">
               <a:rPr lang="en-GB" smtClean="0"/>
-              <a:t>28/07/2022</a:t>
+              <a:t>29/07/2022</a:t>
             </a:fld>
             <a:endParaRPr lang="en-GB"/>
           </a:p>
@@ -1356,7 +1362,7 @@
           <a:p>
             <a:fld id="{D3DA5F4E-FA42-442E-8505-3C5882CD17FC}" type="datetimeFigureOut">
               <a:rPr lang="en-GB" smtClean="0"/>
-              <a:t>28/07/2022</a:t>
+              <a:t>29/07/2022</a:t>
             </a:fld>
             <a:endParaRPr lang="en-GB"/>
           </a:p>
@@ -1785,7 +1791,7 @@
           <a:p>
             <a:fld id="{D3DA5F4E-FA42-442E-8505-3C5882CD17FC}" type="datetimeFigureOut">
               <a:rPr lang="en-GB" smtClean="0"/>
-              <a:t>28/07/2022</a:t>
+              <a:t>29/07/2022</a:t>
             </a:fld>
             <a:endParaRPr lang="en-GB"/>
           </a:p>
@@ -1903,7 +1909,7 @@
           <a:p>
             <a:fld id="{D3DA5F4E-FA42-442E-8505-3C5882CD17FC}" type="datetimeFigureOut">
               <a:rPr lang="en-GB" smtClean="0"/>
-              <a:t>28/07/2022</a:t>
+              <a:t>29/07/2022</a:t>
             </a:fld>
             <a:endParaRPr lang="en-GB"/>
           </a:p>
@@ -1998,7 +2004,7 @@
           <a:p>
             <a:fld id="{D3DA5F4E-FA42-442E-8505-3C5882CD17FC}" type="datetimeFigureOut">
               <a:rPr lang="en-GB" smtClean="0"/>
-              <a:t>28/07/2022</a:t>
+              <a:t>29/07/2022</a:t>
             </a:fld>
             <a:endParaRPr lang="en-GB"/>
           </a:p>
@@ -2354,7 +2360,7 @@
           <a:p>
             <a:fld id="{D3DA5F4E-FA42-442E-8505-3C5882CD17FC}" type="datetimeFigureOut">
               <a:rPr lang="en-GB" smtClean="0"/>
-              <a:t>28/07/2022</a:t>
+              <a:t>29/07/2022</a:t>
             </a:fld>
             <a:endParaRPr lang="en-GB"/>
           </a:p>
@@ -2657,7 +2663,7 @@
           <a:p>
             <a:fld id="{D3DA5F4E-FA42-442E-8505-3C5882CD17FC}" type="datetimeFigureOut">
               <a:rPr lang="en-GB" smtClean="0"/>
-              <a:t>28/07/2022</a:t>
+              <a:t>29/07/2022</a:t>
             </a:fld>
             <a:endParaRPr lang="en-GB"/>
           </a:p>
@@ -2870,7 +2876,7 @@
           <a:p>
             <a:fld id="{D3DA5F4E-FA42-442E-8505-3C5882CD17FC}" type="datetimeFigureOut">
               <a:rPr lang="en-GB" smtClean="0"/>
-              <a:t>28/07/2022</a:t>
+              <a:t>29/07/2022</a:t>
             </a:fld>
             <a:endParaRPr lang="en-GB"/>
           </a:p>
@@ -3328,12 +3334,8 @@
           <a:lstStyle/>
           <a:p>
             <a:r>
-              <a:rPr lang="en-GB" dirty="0" err="1"/>
-              <a:t>Footbal</a:t>
-            </a:r>
-            <a:r>
-              <a:rPr lang="en-GB" dirty="0"/>
-              <a:t> Squad Builder</a:t>
+              <a:rPr lang="en-GB" dirty="0"/>
+              <a:t>Football Squad Builder</a:t>
             </a:r>
             <a:br>
               <a:rPr lang="en-GB" dirty="0"/>
@@ -3414,7 +3416,7 @@
           <p:cNvPr id="2" name="Title 1">
             <a:extLst>
               <a:ext uri="{FF2B5EF4-FFF2-40B4-BE49-F238E27FC236}">
-                <a16:creationId xmlns:a16="http://schemas.microsoft.com/office/drawing/2014/main" id="{95F9CDB9-2652-CE30-C650-9F149D6CBC4B}"/>
+                <a16:creationId xmlns:a16="http://schemas.microsoft.com/office/drawing/2014/main" id="{EFF9BC89-D891-8EF3-C600-693A3659C17D}"/>
               </a:ext>
             </a:extLst>
           </p:cNvPr>
@@ -3432,17 +3434,17 @@
           <a:p>
             <a:r>
               <a:rPr lang="en-GB" dirty="0"/>
-              <a:t>Demonstration</a:t>
-            </a:r>
-          </a:p>
-        </p:txBody>
-      </p:sp>
-      <p:sp>
-        <p:nvSpPr>
-          <p:cNvPr id="3" name="Content Placeholder 2">
+              <a:t>Testing</a:t>
+            </a:r>
+          </a:p>
+        </p:txBody>
+      </p:sp>
+      <p:sp>
+        <p:nvSpPr>
+          <p:cNvPr id="5" name="Content Placeholder 4">
             <a:extLst>
               <a:ext uri="{FF2B5EF4-FFF2-40B4-BE49-F238E27FC236}">
-                <a16:creationId xmlns:a16="http://schemas.microsoft.com/office/drawing/2014/main" id="{338A14F6-F6DE-2DEB-8BC4-4C3D2626F2ED}"/>
+                <a16:creationId xmlns:a16="http://schemas.microsoft.com/office/drawing/2014/main" id="{4F2CC906-29A5-83CD-ABC5-86CD49E5FC76}"/>
               </a:ext>
             </a:extLst>
           </p:cNvPr>
@@ -3458,9 +3460,16 @@
           <a:bodyPr/>
           <a:lstStyle/>
           <a:p>
-            <a:r>
-              <a:rPr lang="en-GB" dirty="0"/>
-              <a:t>User story screenshot and corresponding frontend screenshot</a:t>
+            <a:pPr marL="0" indent="0">
+              <a:buNone/>
+            </a:pPr>
+            <a:r>
+              <a:rPr lang="en-GB" dirty="0" err="1"/>
+              <a:t>src</a:t>
+            </a:r>
+            <a:r>
+              <a:rPr lang="en-GB" dirty="0"/>
+              <a:t>/main/java covered 98.1% by testing.</a:t>
             </a:r>
           </a:p>
         </p:txBody>
@@ -3470,7 +3479,7 @@
           <p:cNvPr id="7" name="Picture 6">
             <a:extLst>
               <a:ext uri="{FF2B5EF4-FFF2-40B4-BE49-F238E27FC236}">
-                <a16:creationId xmlns:a16="http://schemas.microsoft.com/office/drawing/2014/main" id="{92C408FC-183B-002A-1F44-D28B88DB9CC7}"/>
+                <a16:creationId xmlns:a16="http://schemas.microsoft.com/office/drawing/2014/main" id="{A8F058E8-134E-6D53-63BC-208F0061FC61}"/>
               </a:ext>
             </a:extLst>
           </p:cNvPr>
@@ -3487,8 +3496,8 @@
         </p:blipFill>
         <p:spPr>
           <a:xfrm>
-            <a:off x="569169" y="3081973"/>
-            <a:ext cx="3057525" cy="1771650"/>
+            <a:off x="676656" y="2796895"/>
+            <a:ext cx="10243661" cy="2985452"/>
           </a:xfrm>
           <a:prstGeom prst="rect">
             <a:avLst/>
@@ -3498,7 +3507,7 @@
     </p:spTree>
     <p:extLst>
       <p:ext uri="{BB962C8B-B14F-4D97-AF65-F5344CB8AC3E}">
-        <p14:creationId xmlns:p14="http://schemas.microsoft.com/office/powerpoint/2010/main" val="1207296797"/>
+        <p14:creationId xmlns:p14="http://schemas.microsoft.com/office/powerpoint/2010/main" val="2246457359"/>
       </p:ext>
     </p:extLst>
   </p:cSld>
@@ -3530,7 +3539,7 @@
           <p:cNvPr id="2" name="Title 1">
             <a:extLst>
               <a:ext uri="{FF2B5EF4-FFF2-40B4-BE49-F238E27FC236}">
-                <a16:creationId xmlns:a16="http://schemas.microsoft.com/office/drawing/2014/main" id="{4AC69CF5-9E07-E511-869D-AD5C018D9FBB}"/>
+                <a16:creationId xmlns:a16="http://schemas.microsoft.com/office/drawing/2014/main" id="{95F9CDB9-2652-CE30-C650-9F149D6CBC4B}"/>
               </a:ext>
             </a:extLst>
           </p:cNvPr>
@@ -3541,109 +3550,117 @@
             <p:ph type="title"/>
           </p:nvPr>
         </p:nvSpPr>
-        <p:spPr/>
-        <p:txBody>
-          <a:bodyPr/>
-          <a:lstStyle/>
-          <a:p>
-            <a:r>
-              <a:rPr lang="en-GB" dirty="0"/>
-              <a:t>Sprint Review</a:t>
-            </a:r>
-          </a:p>
-        </p:txBody>
-      </p:sp>
-      <p:sp>
-        <p:nvSpPr>
-          <p:cNvPr id="3" name="Content Placeholder 2">
+        <p:spPr>
+          <a:xfrm>
+            <a:off x="193388" y="-87682"/>
+            <a:ext cx="10772775" cy="1658198"/>
+          </a:xfrm>
+        </p:spPr>
+        <p:txBody>
+          <a:bodyPr/>
+          <a:lstStyle/>
+          <a:p>
+            <a:r>
+              <a:rPr lang="en-GB" dirty="0"/>
+              <a:t>Demonstration</a:t>
+            </a:r>
+          </a:p>
+        </p:txBody>
+      </p:sp>
+      <p:pic>
+        <p:nvPicPr>
+          <p:cNvPr id="7" name="Picture 6">
             <a:extLst>
               <a:ext uri="{FF2B5EF4-FFF2-40B4-BE49-F238E27FC236}">
-                <a16:creationId xmlns:a16="http://schemas.microsoft.com/office/drawing/2014/main" id="{86FF2A85-62C8-DA9A-F935-5D6515B19915}"/>
+                <a16:creationId xmlns:a16="http://schemas.microsoft.com/office/drawing/2014/main" id="{92C408FC-183B-002A-1F44-D28B88DB9CC7}"/>
               </a:ext>
             </a:extLst>
           </p:cNvPr>
-          <p:cNvSpPr>
-            <a:spLocks noGrp="1"/>
-          </p:cNvSpPr>
-          <p:nvPr>
-            <p:ph idx="1"/>
-          </p:nvPr>
-        </p:nvSpPr>
-        <p:spPr/>
-        <p:txBody>
-          <a:bodyPr/>
-          <a:lstStyle/>
-          <a:p>
-            <a:pPr marL="0" indent="0">
-              <a:buNone/>
-            </a:pPr>
-            <a:r>
-              <a:rPr lang="en-GB" dirty="0"/>
-              <a:t>Sprint review as of the time this presentation was given:</a:t>
-            </a:r>
-          </a:p>
-          <a:p>
-            <a:pPr marL="0" indent="0">
-              <a:buNone/>
-            </a:pPr>
-            <a:endParaRPr lang="en-GB" dirty="0"/>
-          </a:p>
-          <a:p>
-            <a:pPr marL="0" indent="0">
-              <a:buNone/>
-            </a:pPr>
-            <a:r>
-              <a:rPr lang="en-GB" dirty="0"/>
-              <a:t>Completed work: </a:t>
-            </a:r>
-          </a:p>
-          <a:p>
-            <a:pPr marL="0" indent="0">
-              <a:buNone/>
-            </a:pPr>
-            <a:r>
-              <a:rPr lang="en-GB" dirty="0"/>
-              <a:t>	- Minimum Viable Product achieved to a good standard. Completed Risk 	Assessment, ERD, </a:t>
-            </a:r>
-            <a:r>
-              <a:rPr lang="en-GB" dirty="0" err="1"/>
-              <a:t>MoSCoW</a:t>
-            </a:r>
-            <a:r>
-              <a:rPr lang="en-GB" dirty="0"/>
-              <a:t>, </a:t>
-            </a:r>
-          </a:p>
-          <a:p>
-            <a:pPr marL="0" indent="0">
-              <a:buNone/>
-            </a:pPr>
-            <a:r>
-              <a:rPr lang="en-GB" dirty="0"/>
-              <a:t>	- Test coverage of 97% in the backend</a:t>
-            </a:r>
-          </a:p>
-          <a:p>
-            <a:pPr marL="0" indent="0">
-              <a:buNone/>
-            </a:pPr>
-            <a:r>
-              <a:rPr lang="en-GB" dirty="0"/>
-              <a:t>	- Most tasks completed on project management board.</a:t>
-            </a:r>
-          </a:p>
-          <a:p>
-            <a:pPr marL="0" indent="0">
-              <a:buNone/>
-            </a:pPr>
-            <a:endParaRPr lang="en-GB" dirty="0"/>
-          </a:p>
-        </p:txBody>
-      </p:sp>
+          <p:cNvPicPr>
+            <a:picLocks noChangeAspect="1"/>
+          </p:cNvPicPr>
+          <p:nvPr/>
+        </p:nvPicPr>
+        <p:blipFill>
+          <a:blip r:embed="rId2"/>
+          <a:stretch>
+            <a:fillRect/>
+          </a:stretch>
+        </p:blipFill>
+        <p:spPr>
+          <a:xfrm>
+            <a:off x="343701" y="1318462"/>
+            <a:ext cx="3662172" cy="2122006"/>
+          </a:xfrm>
+          <a:prstGeom prst="rect">
+            <a:avLst/>
+          </a:prstGeom>
+        </p:spPr>
+      </p:pic>
+      <p:pic>
+        <p:nvPicPr>
+          <p:cNvPr id="5" name="Picture 4">
+            <a:extLst>
+              <a:ext uri="{FF2B5EF4-FFF2-40B4-BE49-F238E27FC236}">
+                <a16:creationId xmlns:a16="http://schemas.microsoft.com/office/drawing/2014/main" id="{D2237DFA-D0DC-C584-6E7F-CFB1A705B95A}"/>
+              </a:ext>
+            </a:extLst>
+          </p:cNvPr>
+          <p:cNvPicPr>
+            <a:picLocks noChangeAspect="1"/>
+          </p:cNvPicPr>
+          <p:nvPr/>
+        </p:nvPicPr>
+        <p:blipFill>
+          <a:blip r:embed="rId3"/>
+          <a:stretch>
+            <a:fillRect/>
+          </a:stretch>
+        </p:blipFill>
+        <p:spPr>
+          <a:xfrm>
+            <a:off x="4185789" y="1318462"/>
+            <a:ext cx="7662510" cy="4665480"/>
+          </a:xfrm>
+          <a:prstGeom prst="rect">
+            <a:avLst/>
+          </a:prstGeom>
+        </p:spPr>
+      </p:pic>
+      <p:pic>
+        <p:nvPicPr>
+          <p:cNvPr id="10" name="Picture 9">
+            <a:extLst>
+              <a:ext uri="{FF2B5EF4-FFF2-40B4-BE49-F238E27FC236}">
+                <a16:creationId xmlns:a16="http://schemas.microsoft.com/office/drawing/2014/main" id="{1613927B-96DF-213B-658F-6A76F558838D}"/>
+              </a:ext>
+            </a:extLst>
+          </p:cNvPr>
+          <p:cNvPicPr>
+            <a:picLocks noChangeAspect="1"/>
+          </p:cNvPicPr>
+          <p:nvPr/>
+        </p:nvPicPr>
+        <p:blipFill>
+          <a:blip r:embed="rId4"/>
+          <a:stretch>
+            <a:fillRect/>
+          </a:stretch>
+        </p:blipFill>
+        <p:spPr>
+          <a:xfrm>
+            <a:off x="343701" y="3810906"/>
+            <a:ext cx="3662172" cy="2173036"/>
+          </a:xfrm>
+          <a:prstGeom prst="rect">
+            <a:avLst/>
+          </a:prstGeom>
+        </p:spPr>
+      </p:pic>
     </p:spTree>
     <p:extLst>
       <p:ext uri="{BB962C8B-B14F-4D97-AF65-F5344CB8AC3E}">
-        <p14:creationId xmlns:p14="http://schemas.microsoft.com/office/powerpoint/2010/main" val="2673777753"/>
+        <p14:creationId xmlns:p14="http://schemas.microsoft.com/office/powerpoint/2010/main" val="1207296797"/>
       </p:ext>
     </p:extLst>
   </p:cSld>
@@ -3675,7 +3692,7 @@
           <p:cNvPr id="2" name="Title 1">
             <a:extLst>
               <a:ext uri="{FF2B5EF4-FFF2-40B4-BE49-F238E27FC236}">
-                <a16:creationId xmlns:a16="http://schemas.microsoft.com/office/drawing/2014/main" id="{2A10E95F-A91B-52F9-B537-343E9CE99830}"/>
+                <a16:creationId xmlns:a16="http://schemas.microsoft.com/office/drawing/2014/main" id="{4AC69CF5-9E07-E511-869D-AD5C018D9FBB}"/>
               </a:ext>
             </a:extLst>
           </p:cNvPr>
@@ -3703,7 +3720,7 @@
           <p:cNvPr id="3" name="Content Placeholder 2">
             <a:extLst>
               <a:ext uri="{FF2B5EF4-FFF2-40B4-BE49-F238E27FC236}">
-                <a16:creationId xmlns:a16="http://schemas.microsoft.com/office/drawing/2014/main" id="{2546AF65-8B1F-D015-D509-312E5B703430}"/>
+                <a16:creationId xmlns:a16="http://schemas.microsoft.com/office/drawing/2014/main" id="{86FF2A85-62C8-DA9A-F935-5D6515B19915}"/>
               </a:ext>
             </a:extLst>
           </p:cNvPr>
@@ -3719,60 +3736,66 @@
           <a:bodyPr/>
           <a:lstStyle/>
           <a:p>
-            <a:r>
-              <a:rPr lang="en-GB" dirty="0"/>
-              <a:t>Things left behind:</a:t>
-            </a:r>
-          </a:p>
-          <a:p>
-            <a:pPr marL="4572" lvl="1" indent="0">
+            <a:pPr marL="0" indent="0">
               <a:buNone/>
             </a:pPr>
             <a:r>
               <a:rPr lang="en-GB" dirty="0"/>
-              <a:t>	- Adding additional entities</a:t>
-            </a:r>
-          </a:p>
-          <a:p>
-            <a:pPr marL="4572" lvl="1" indent="0">
-              <a:buNone/>
-            </a:pPr>
-            <a:r>
-              <a:rPr lang="en-GB" dirty="0"/>
-              <a:t>	- Search function</a:t>
-            </a:r>
-          </a:p>
-          <a:p>
-            <a:pPr marL="4572" lvl="1" indent="0">
-              <a:buNone/>
-            </a:pPr>
-            <a:r>
-              <a:rPr lang="en-GB" dirty="0"/>
-              <a:t>	- Better frontend design</a:t>
-            </a:r>
-          </a:p>
-          <a:p>
-            <a:pPr marL="4572" lvl="1" indent="0">
-              <a:buNone/>
-            </a:pPr>
-            <a:r>
-              <a:rPr lang="en-GB" dirty="0"/>
-              <a:t>	- </a:t>
-            </a:r>
-            <a:r>
-              <a:rPr lang="en-GB" dirty="0" err="1"/>
-              <a:t>Sonarqube</a:t>
-            </a:r>
-            <a:endParaRPr lang="en-GB" dirty="0"/>
-          </a:p>
-          <a:p>
-            <a:pPr marL="4572" lvl="1" indent="0">
+              <a:t>Sprint review as of the time this presentation was given:</a:t>
+            </a:r>
+          </a:p>
+          <a:p>
+            <a:pPr marL="0" indent="0">
               <a:buNone/>
             </a:pPr>
             <a:endParaRPr lang="en-GB" dirty="0"/>
           </a:p>
           <a:p>
-            <a:pPr marL="4572" lvl="1" indent="0">
+            <a:pPr marL="0" indent="0">
+              <a:buNone/>
+            </a:pPr>
+            <a:r>
+              <a:rPr lang="en-GB" dirty="0"/>
+              <a:t>Completed work: </a:t>
+            </a:r>
+          </a:p>
+          <a:p>
+            <a:pPr marL="0" indent="0">
+              <a:buNone/>
+            </a:pPr>
+            <a:r>
+              <a:rPr lang="en-GB" dirty="0"/>
+              <a:t>	- Minimum Viable Product achieved to a good standard. Completed Risk 	Assessment, ERD, </a:t>
+            </a:r>
+            <a:r>
+              <a:rPr lang="en-GB" dirty="0" err="1"/>
+              <a:t>MoSCoW</a:t>
+            </a:r>
+            <a:r>
+              <a:rPr lang="en-GB" dirty="0"/>
+              <a:t>, UML, Wireframe documents.</a:t>
+            </a:r>
+          </a:p>
+          <a:p>
+            <a:pPr marL="0" indent="0">
+              <a:buNone/>
+            </a:pPr>
+            <a:r>
+              <a:rPr lang="en-GB" dirty="0"/>
+              <a:t>	- Test coverage of 98.1% in the backend</a:t>
+            </a:r>
+          </a:p>
+          <a:p>
+            <a:pPr marL="0" indent="0">
+              <a:buNone/>
+            </a:pPr>
+            <a:r>
+              <a:rPr lang="en-GB" dirty="0"/>
+              <a:t>	- Most tasks completed on project management board.</a:t>
+            </a:r>
+          </a:p>
+          <a:p>
+            <a:pPr marL="0" indent="0">
               <a:buNone/>
             </a:pPr>
             <a:endParaRPr lang="en-GB" dirty="0"/>
@@ -3782,7 +3805,7 @@
     </p:spTree>
     <p:extLst>
       <p:ext uri="{BB962C8B-B14F-4D97-AF65-F5344CB8AC3E}">
-        <p14:creationId xmlns:p14="http://schemas.microsoft.com/office/powerpoint/2010/main" val="4065750141"/>
+        <p14:creationId xmlns:p14="http://schemas.microsoft.com/office/powerpoint/2010/main" val="2673777753"/>
       </p:ext>
     </p:extLst>
   </p:cSld>
@@ -3814,7 +3837,7 @@
           <p:cNvPr id="2" name="Title 1">
             <a:extLst>
               <a:ext uri="{FF2B5EF4-FFF2-40B4-BE49-F238E27FC236}">
-                <a16:creationId xmlns:a16="http://schemas.microsoft.com/office/drawing/2014/main" id="{16BF8DE3-BCC8-18C3-4B74-C17C1F51037B}"/>
+                <a16:creationId xmlns:a16="http://schemas.microsoft.com/office/drawing/2014/main" id="{2A10E95F-A91B-52F9-B537-343E9CE99830}"/>
               </a:ext>
             </a:extLst>
           </p:cNvPr>
@@ -3832,7 +3855,7 @@
           <a:p>
             <a:r>
               <a:rPr lang="en-GB" dirty="0"/>
-              <a:t>Sprint Retrospective</a:t>
+              <a:t>Sprint Review</a:t>
             </a:r>
           </a:p>
         </p:txBody>
@@ -3842,7 +3865,7 @@
           <p:cNvPr id="3" name="Content Placeholder 2">
             <a:extLst>
               <a:ext uri="{FF2B5EF4-FFF2-40B4-BE49-F238E27FC236}">
-                <a16:creationId xmlns:a16="http://schemas.microsoft.com/office/drawing/2014/main" id="{E35000AD-AAA0-81CE-0D0E-D0DF74B94080}"/>
+                <a16:creationId xmlns:a16="http://schemas.microsoft.com/office/drawing/2014/main" id="{2546AF65-8B1F-D015-D509-312E5B703430}"/>
               </a:ext>
             </a:extLst>
           </p:cNvPr>
@@ -3860,21 +3883,7 @@
           <a:p>
             <a:r>
               <a:rPr lang="en-GB" dirty="0"/>
-              <a:t>What could have been done better?</a:t>
-            </a:r>
-          </a:p>
-          <a:p>
-            <a:pPr lvl="1"/>
-            <a:r>
-              <a:rPr lang="en-GB" dirty="0"/>
-              <a:t>- The minimum viable product could have been completed earlier, allowing more time to refine the project and add additional features. However due to time constraints and disruption this would not have been easy.</a:t>
-            </a:r>
-          </a:p>
-          <a:p>
-            <a:pPr lvl="1"/>
-            <a:r>
-              <a:rPr lang="en-GB" dirty="0"/>
-              <a:t>- Better use of version control. Whilst the project did not have many features, perhaps more feature branches could have been utilised.</a:t>
+              <a:t>Things left behind:</a:t>
             </a:r>
           </a:p>
           <a:p>
@@ -3883,35 +3892,59 @@
             </a:pPr>
             <a:r>
               <a:rPr lang="en-GB" dirty="0"/>
-              <a:t>What went well?</a:t>
-            </a:r>
-          </a:p>
-          <a:p>
-            <a:pPr lvl="1">
-              <a:buFontTx/>
-              <a:buChar char="-"/>
+              <a:t>	- Adding additional entities</a:t>
+            </a:r>
+          </a:p>
+          <a:p>
+            <a:pPr marL="4572" lvl="1" indent="0">
+              <a:buNone/>
             </a:pPr>
             <a:r>
               <a:rPr lang="en-GB" dirty="0"/>
-              <a:t>MVP completed to a good understand and efficiently.</a:t>
-            </a:r>
-          </a:p>
-          <a:p>
-            <a:pPr lvl="1">
-              <a:buFontTx/>
-              <a:buChar char="-"/>
+              <a:t>	- Search function</a:t>
+            </a:r>
+          </a:p>
+          <a:p>
+            <a:pPr marL="4572" lvl="1" indent="0">
+              <a:buNone/>
             </a:pPr>
             <a:r>
               <a:rPr lang="en-GB" dirty="0"/>
-              <a:t>Good experience and knowledge gained in the use of frontend technologies and linking to the backend.</a:t>
-            </a:r>
+              <a:t>	- Better frontend design</a:t>
+            </a:r>
+          </a:p>
+          <a:p>
+            <a:pPr marL="4572" lvl="1" indent="0">
+              <a:buNone/>
+            </a:pPr>
+            <a:r>
+              <a:rPr lang="en-GB" dirty="0"/>
+              <a:t>	- </a:t>
+            </a:r>
+            <a:r>
+              <a:rPr lang="en-GB" dirty="0" err="1"/>
+              <a:t>Sonarqube</a:t>
+            </a:r>
+            <a:endParaRPr lang="en-GB" dirty="0"/>
+          </a:p>
+          <a:p>
+            <a:pPr marL="4572" lvl="1" indent="0">
+              <a:buNone/>
+            </a:pPr>
+            <a:endParaRPr lang="en-GB" dirty="0"/>
+          </a:p>
+          <a:p>
+            <a:pPr marL="4572" lvl="1" indent="0">
+              <a:buNone/>
+            </a:pPr>
+            <a:endParaRPr lang="en-GB" dirty="0"/>
           </a:p>
         </p:txBody>
       </p:sp>
     </p:spTree>
     <p:extLst>
       <p:ext uri="{BB962C8B-B14F-4D97-AF65-F5344CB8AC3E}">
-        <p14:creationId xmlns:p14="http://schemas.microsoft.com/office/powerpoint/2010/main" val="1655455113"/>
+        <p14:creationId xmlns:p14="http://schemas.microsoft.com/office/powerpoint/2010/main" val="4065750141"/>
       </p:ext>
     </p:extLst>
   </p:cSld>
@@ -3943,7 +3976,7 @@
           <p:cNvPr id="2" name="Title 1">
             <a:extLst>
               <a:ext uri="{FF2B5EF4-FFF2-40B4-BE49-F238E27FC236}">
-                <a16:creationId xmlns:a16="http://schemas.microsoft.com/office/drawing/2014/main" id="{F08D7D79-45D4-91C7-91DA-DFC64A57782C}"/>
+                <a16:creationId xmlns:a16="http://schemas.microsoft.com/office/drawing/2014/main" id="{16BF8DE3-BCC8-18C3-4B74-C17C1F51037B}"/>
               </a:ext>
             </a:extLst>
           </p:cNvPr>
@@ -3961,7 +3994,7 @@
           <a:p>
             <a:r>
               <a:rPr lang="en-GB" dirty="0"/>
-              <a:t>Conclusion</a:t>
+              <a:t>Sprint Retrospective</a:t>
             </a:r>
           </a:p>
         </p:txBody>
@@ -3971,7 +4004,7 @@
           <p:cNvPr id="3" name="Content Placeholder 2">
             <a:extLst>
               <a:ext uri="{FF2B5EF4-FFF2-40B4-BE49-F238E27FC236}">
-                <a16:creationId xmlns:a16="http://schemas.microsoft.com/office/drawing/2014/main" id="{5F1CD6E6-1997-CE86-8EE3-9BD23CC51E76}"/>
+                <a16:creationId xmlns:a16="http://schemas.microsoft.com/office/drawing/2014/main" id="{E35000AD-AAA0-81CE-0D0E-D0DF74B94080}"/>
               </a:ext>
             </a:extLst>
           </p:cNvPr>
@@ -3987,32 +4020,67 @@
           <a:bodyPr/>
           <a:lstStyle/>
           <a:p>
-            <a:r>
-              <a:rPr lang="en-GB" dirty="0"/>
-              <a:t>A successful project as the MVP was achieved and scope adhered to.</a:t>
-            </a:r>
-          </a:p>
-          <a:p>
-            <a:endParaRPr lang="en-GB" dirty="0"/>
-          </a:p>
-          <a:p>
-            <a:r>
-              <a:rPr lang="en-GB" dirty="0"/>
-              <a:t>Lots learned regarding frontend and connecting to the backend. More experience in project planning and project management is very useful. Gaining familiarity with using the tools and technologies independently.</a:t>
-            </a:r>
-          </a:p>
-          <a:p>
-            <a:endParaRPr lang="en-GB" dirty="0"/>
-          </a:p>
-          <a:p>
-            <a:endParaRPr lang="en-GB" dirty="0"/>
+            <a:pPr marL="0" indent="0">
+              <a:buNone/>
+            </a:pPr>
+            <a:r>
+              <a:rPr lang="en-GB" dirty="0"/>
+              <a:t>What could have been done better?</a:t>
+            </a:r>
+          </a:p>
+          <a:p>
+            <a:pPr marL="4572" lvl="1" indent="0">
+              <a:buNone/>
+            </a:pPr>
+            <a:r>
+              <a:rPr lang="en-GB" dirty="0"/>
+              <a:t>- The minimum viable product could have been completed earlier, allowing more time to refine the project and add additional features. However due to time constraints and disruption this would not have been easy.</a:t>
+            </a:r>
+          </a:p>
+          <a:p>
+            <a:pPr marL="4572" lvl="1" indent="0">
+              <a:buNone/>
+            </a:pPr>
+            <a:r>
+              <a:rPr lang="en-GB" dirty="0"/>
+              <a:t>- Better use of version control. Whilst the project did not have many features, perhaps more feature branches could have been utilised.</a:t>
+            </a:r>
+          </a:p>
+          <a:p>
+            <a:pPr marL="4572" lvl="1" indent="0">
+              <a:buNone/>
+            </a:pPr>
+            <a:r>
+              <a:rPr lang="en-GB" dirty="0"/>
+              <a:t>What went well?</a:t>
+            </a:r>
+          </a:p>
+          <a:p>
+            <a:pPr lvl="1">
+              <a:buFontTx/>
+              <a:buChar char="-"/>
+            </a:pPr>
+            <a:r>
+              <a:rPr lang="en-GB" dirty="0"/>
+              <a:t>MVP completed to a good understand and efficiently.</a:t>
+            </a:r>
+          </a:p>
+          <a:p>
+            <a:pPr lvl="1">
+              <a:buFontTx/>
+              <a:buChar char="-"/>
+            </a:pPr>
+            <a:r>
+              <a:rPr lang="en-GB" dirty="0"/>
+              <a:t>Good experience and knowledge gained in the use of frontend technologies and linking to the backend.</a:t>
+            </a:r>
           </a:p>
         </p:txBody>
       </p:sp>
     </p:spTree>
     <p:extLst>
       <p:ext uri="{BB962C8B-B14F-4D97-AF65-F5344CB8AC3E}">
-        <p14:creationId xmlns:p14="http://schemas.microsoft.com/office/powerpoint/2010/main" val="364393066"/>
+        <p14:creationId xmlns:p14="http://schemas.microsoft.com/office/powerpoint/2010/main" val="1655455113"/>
       </p:ext>
     </p:extLst>
   </p:cSld>
@@ -4044,6 +4112,107 @@
           <p:cNvPr id="2" name="Title 1">
             <a:extLst>
               <a:ext uri="{FF2B5EF4-FFF2-40B4-BE49-F238E27FC236}">
+                <a16:creationId xmlns:a16="http://schemas.microsoft.com/office/drawing/2014/main" id="{F08D7D79-45D4-91C7-91DA-DFC64A57782C}"/>
+              </a:ext>
+            </a:extLst>
+          </p:cNvPr>
+          <p:cNvSpPr>
+            <a:spLocks noGrp="1"/>
+          </p:cNvSpPr>
+          <p:nvPr>
+            <p:ph type="title"/>
+          </p:nvPr>
+        </p:nvSpPr>
+        <p:spPr/>
+        <p:txBody>
+          <a:bodyPr/>
+          <a:lstStyle/>
+          <a:p>
+            <a:r>
+              <a:rPr lang="en-GB" dirty="0"/>
+              <a:t>Conclusion</a:t>
+            </a:r>
+          </a:p>
+        </p:txBody>
+      </p:sp>
+      <p:sp>
+        <p:nvSpPr>
+          <p:cNvPr id="3" name="Content Placeholder 2">
+            <a:extLst>
+              <a:ext uri="{FF2B5EF4-FFF2-40B4-BE49-F238E27FC236}">
+                <a16:creationId xmlns:a16="http://schemas.microsoft.com/office/drawing/2014/main" id="{5F1CD6E6-1997-CE86-8EE3-9BD23CC51E76}"/>
+              </a:ext>
+            </a:extLst>
+          </p:cNvPr>
+          <p:cNvSpPr>
+            <a:spLocks noGrp="1"/>
+          </p:cNvSpPr>
+          <p:nvPr>
+            <p:ph idx="1"/>
+          </p:nvPr>
+        </p:nvSpPr>
+        <p:spPr/>
+        <p:txBody>
+          <a:bodyPr/>
+          <a:lstStyle/>
+          <a:p>
+            <a:r>
+              <a:rPr lang="en-GB" dirty="0"/>
+              <a:t>A successful project as the MVP was achieved and scope adhered to.</a:t>
+            </a:r>
+          </a:p>
+          <a:p>
+            <a:endParaRPr lang="en-GB" dirty="0"/>
+          </a:p>
+          <a:p>
+            <a:r>
+              <a:rPr lang="en-GB" dirty="0"/>
+              <a:t>Lots learned regarding frontend and connecting to the backend. More experience in project planning and project management is very useful. Gaining familiarity with using the tools and technologies independently.</a:t>
+            </a:r>
+          </a:p>
+          <a:p>
+            <a:endParaRPr lang="en-GB" dirty="0"/>
+          </a:p>
+          <a:p>
+            <a:endParaRPr lang="en-GB" dirty="0"/>
+          </a:p>
+        </p:txBody>
+      </p:sp>
+    </p:spTree>
+    <p:extLst>
+      <p:ext uri="{BB962C8B-B14F-4D97-AF65-F5344CB8AC3E}">
+        <p14:creationId xmlns:p14="http://schemas.microsoft.com/office/powerpoint/2010/main" val="364393066"/>
+      </p:ext>
+    </p:extLst>
+  </p:cSld>
+  <p:clrMapOvr>
+    <a:masterClrMapping/>
+  </p:clrMapOvr>
+</p:sld>
+</file>
+
+<file path=ppt/slides/slide16.xml><?xml version="1.0" encoding="utf-8"?>
+<p:sld xmlns:a="http://schemas.openxmlformats.org/drawingml/2006/main" xmlns:r="http://schemas.openxmlformats.org/officeDocument/2006/relationships" xmlns:p="http://schemas.openxmlformats.org/presentationml/2006/main">
+  <p:cSld>
+    <p:spTree>
+      <p:nvGrpSpPr>
+        <p:cNvPr id="1" name=""/>
+        <p:cNvGrpSpPr/>
+        <p:nvPr/>
+      </p:nvGrpSpPr>
+      <p:grpSpPr>
+        <a:xfrm>
+          <a:off x="0" y="0"/>
+          <a:ext cx="0" cy="0"/>
+          <a:chOff x="0" y="0"/>
+          <a:chExt cx="0" cy="0"/>
+        </a:xfrm>
+      </p:grpSpPr>
+      <p:sp>
+        <p:nvSpPr>
+          <p:cNvPr id="2" name="Title 1">
+            <a:extLst>
+              <a:ext uri="{FF2B5EF4-FFF2-40B4-BE49-F238E27FC236}">
                 <a16:creationId xmlns:a16="http://schemas.microsoft.com/office/drawing/2014/main" id="{340507E7-466D-F35A-A4C0-AA05D5797D38}"/>
               </a:ext>
             </a:extLst>
@@ -4090,16 +4259,13 @@
           <a:p>
             <a:r>
               <a:rPr lang="en-GB" dirty="0"/>
-              <a:t>To finish off this project, all that needs to be done is finalising documentation, checking the project, and finishing the build, and merging into the main branch.</a:t>
-            </a:r>
-          </a:p>
-          <a:p>
-            <a:endParaRPr lang="en-GB" dirty="0"/>
-          </a:p>
-          <a:p>
-            <a:r>
-              <a:rPr lang="en-GB" dirty="0"/>
-              <a:t>However, this is a project I could see myself adding onto in the future. I have some ideas that would improve the design and usability in the frontend whilst I would also like to add additional tables to store entire squads of players that could then be accessed. This would be a good challenge to make use of my skills as I get better with these technologies..</a:t>
+              <a:t>To finish off this project all that needs to be done is finishing the README file and merge into the main branch.</a:t>
+            </a:r>
+          </a:p>
+          <a:p>
+            <a:r>
+              <a:rPr lang="en-GB" dirty="0"/>
+              <a:t>However, this is a project I could see myself adding onto in the future. I have some ideas that would improve the design and usability in the frontend whilst I would also like to add additional tables to store entire squads of players that could then be accessed. This would be a good challenge to make use of my skills as I get better with these technologies.</a:t>
             </a:r>
           </a:p>
         </p:txBody>
@@ -4117,7 +4283,7 @@
 </p:sld>
 </file>
 
-<file path=ppt/slides/slide16.xml><?xml version="1.0" encoding="utf-8"?>
+<file path=ppt/slides/slide17.xml><?xml version="1.0" encoding="utf-8"?>
 <p:sld xmlns:a="http://schemas.openxmlformats.org/drawingml/2006/main" xmlns:r="http://schemas.openxmlformats.org/officeDocument/2006/relationships" xmlns:p="http://schemas.openxmlformats.org/presentationml/2006/main">
   <p:cSld>
     <p:spTree>
@@ -4268,13 +4434,16 @@
           <a:p>
             <a:r>
               <a:rPr lang="en-GB" dirty="0"/>
-              <a:t>Lewis Pearson, Mechanical Engineering graduate</a:t>
-            </a:r>
-          </a:p>
-          <a:p>
-            <a:r>
-              <a:rPr lang="en-GB" dirty="0"/>
-              <a:t>and Tech Specialist at QA Ltd.</a:t>
+              <a:t>Lewis Pearson, Mechanical Engineering graduate and Tech Specialist at QA Ltd.</a:t>
+            </a:r>
+          </a:p>
+          <a:p>
+            <a:endParaRPr lang="en-GB" dirty="0"/>
+          </a:p>
+          <a:p>
+            <a:r>
+              <a:rPr lang="en-GB" dirty="0"/>
+              <a:t>Project specification is to design an application related to a hobby. For this project I’ve created a football squad builder.</a:t>
             </a:r>
           </a:p>
         </p:txBody>
@@ -4668,13 +4837,8 @@
           <a:p>
             <a:r>
               <a:rPr lang="en-GB" dirty="0"/>
-              <a:t>Git and </a:t>
-            </a:r>
-            <a:r>
-              <a:rPr lang="en-GB" dirty="0" err="1"/>
-              <a:t>Github</a:t>
-            </a:r>
-            <a:endParaRPr lang="en-GB" dirty="0"/>
+              <a:t>Git and GitHub</a:t>
+            </a:r>
           </a:p>
         </p:txBody>
       </p:sp>
@@ -4960,75 +5124,40 @@
           <a:chExt cx="0" cy="0"/>
         </a:xfrm>
       </p:grpSpPr>
-      <p:sp>
-        <p:nvSpPr>
-          <p:cNvPr id="2" name="Title 1">
+      <p:pic>
+        <p:nvPicPr>
+          <p:cNvPr id="5" name="Picture 4">
             <a:extLst>
               <a:ext uri="{FF2B5EF4-FFF2-40B4-BE49-F238E27FC236}">
-                <a16:creationId xmlns:a16="http://schemas.microsoft.com/office/drawing/2014/main" id="{EFF9BC89-D891-8EF3-C600-693A3659C17D}"/>
+                <a16:creationId xmlns:a16="http://schemas.microsoft.com/office/drawing/2014/main" id="{8D961A5D-1848-D3FA-E631-5C68C8AE23BD}"/>
               </a:ext>
             </a:extLst>
           </p:cNvPr>
-          <p:cNvSpPr>
-            <a:spLocks noGrp="1"/>
-          </p:cNvSpPr>
-          <p:nvPr>
-            <p:ph type="title"/>
-          </p:nvPr>
-        </p:nvSpPr>
-        <p:spPr/>
-        <p:txBody>
-          <a:bodyPr/>
-          <a:lstStyle/>
-          <a:p>
-            <a:r>
-              <a:rPr lang="en-GB" dirty="0"/>
-              <a:t>Testing</a:t>
-            </a:r>
-          </a:p>
-        </p:txBody>
-      </p:sp>
-      <p:sp>
-        <p:nvSpPr>
-          <p:cNvPr id="3" name="Content Placeholder 2">
-            <a:extLst>
-              <a:ext uri="{FF2B5EF4-FFF2-40B4-BE49-F238E27FC236}">
-                <a16:creationId xmlns:a16="http://schemas.microsoft.com/office/drawing/2014/main" id="{69007B32-B1C5-46CF-1F94-73DFFAED05D7}"/>
-              </a:ext>
-            </a:extLst>
-          </p:cNvPr>
-          <p:cNvSpPr>
-            <a:spLocks noGrp="1"/>
-          </p:cNvSpPr>
-          <p:nvPr>
-            <p:ph idx="1"/>
-          </p:nvPr>
-        </p:nvSpPr>
-        <p:spPr/>
-        <p:txBody>
-          <a:bodyPr/>
-          <a:lstStyle/>
-          <a:p>
-            <a:r>
-              <a:rPr lang="en-GB" dirty="0"/>
-              <a:t>Screenshot of coverage</a:t>
-            </a:r>
-          </a:p>
-          <a:p>
-            <a:endParaRPr lang="en-GB" dirty="0"/>
-          </a:p>
-          <a:p>
-            <a:r>
-              <a:rPr lang="en-GB" dirty="0"/>
-              <a:t>Backend tested</a:t>
-            </a:r>
-          </a:p>
-        </p:txBody>
-      </p:sp>
+          <p:cNvPicPr>
+            <a:picLocks noChangeAspect="1"/>
+          </p:cNvPicPr>
+          <p:nvPr/>
+        </p:nvPicPr>
+        <p:blipFill>
+          <a:blip r:embed="rId2"/>
+          <a:stretch>
+            <a:fillRect/>
+          </a:stretch>
+        </p:blipFill>
+        <p:spPr>
+          <a:xfrm>
+            <a:off x="942975" y="1066604"/>
+            <a:ext cx="10306050" cy="4524375"/>
+          </a:xfrm>
+          <a:prstGeom prst="rect">
+            <a:avLst/>
+          </a:prstGeom>
+        </p:spPr>
+      </p:pic>
     </p:spTree>
     <p:extLst>
       <p:ext uri="{BB962C8B-B14F-4D97-AF65-F5344CB8AC3E}">
-        <p14:creationId xmlns:p14="http://schemas.microsoft.com/office/powerpoint/2010/main" val="2246457359"/>
+        <p14:creationId xmlns:p14="http://schemas.microsoft.com/office/powerpoint/2010/main" val="2756507031"/>
       </p:ext>
     </p:extLst>
   </p:cSld>

</xml_diff>